<commit_message>
a bunch of work
</commit_message>
<xml_diff>
--- a/figures/Box1_action_threshold_origin.pptx
+++ b/figures/Box1_action_threshold_origin.pptx
@@ -259,7 +259,7 @@
           <a:p>
             <a:fld id="{DE1B52ED-5A32-3B40-B289-658C0187859D}" type="datetimeFigureOut">
               <a:rPr lang="en-US" smtClean="0"/>
-              <a:t>7/23/21</a:t>
+              <a:t>9/30/21</a:t>
             </a:fld>
             <a:endParaRPr lang="en-US"/>
           </a:p>
@@ -457,7 +457,7 @@
           <a:p>
             <a:fld id="{DE1B52ED-5A32-3B40-B289-658C0187859D}" type="datetimeFigureOut">
               <a:rPr lang="en-US" smtClean="0"/>
-              <a:t>7/23/21</a:t>
+              <a:t>9/30/21</a:t>
             </a:fld>
             <a:endParaRPr lang="en-US"/>
           </a:p>
@@ -665,7 +665,7 @@
           <a:p>
             <a:fld id="{DE1B52ED-5A32-3B40-B289-658C0187859D}" type="datetimeFigureOut">
               <a:rPr lang="en-US" smtClean="0"/>
-              <a:t>7/23/21</a:t>
+              <a:t>9/30/21</a:t>
             </a:fld>
             <a:endParaRPr lang="en-US"/>
           </a:p>
@@ -863,7 +863,7 @@
           <a:p>
             <a:fld id="{DE1B52ED-5A32-3B40-B289-658C0187859D}" type="datetimeFigureOut">
               <a:rPr lang="en-US" smtClean="0"/>
-              <a:t>7/23/21</a:t>
+              <a:t>9/30/21</a:t>
             </a:fld>
             <a:endParaRPr lang="en-US"/>
           </a:p>
@@ -1138,7 +1138,7 @@
           <a:p>
             <a:fld id="{DE1B52ED-5A32-3B40-B289-658C0187859D}" type="datetimeFigureOut">
               <a:rPr lang="en-US" smtClean="0"/>
-              <a:t>7/23/21</a:t>
+              <a:t>9/30/21</a:t>
             </a:fld>
             <a:endParaRPr lang="en-US"/>
           </a:p>
@@ -1403,7 +1403,7 @@
           <a:p>
             <a:fld id="{DE1B52ED-5A32-3B40-B289-658C0187859D}" type="datetimeFigureOut">
               <a:rPr lang="en-US" smtClean="0"/>
-              <a:t>7/23/21</a:t>
+              <a:t>9/30/21</a:t>
             </a:fld>
             <a:endParaRPr lang="en-US"/>
           </a:p>
@@ -1815,7 +1815,7 @@
           <a:p>
             <a:fld id="{DE1B52ED-5A32-3B40-B289-658C0187859D}" type="datetimeFigureOut">
               <a:rPr lang="en-US" smtClean="0"/>
-              <a:t>7/23/21</a:t>
+              <a:t>9/30/21</a:t>
             </a:fld>
             <a:endParaRPr lang="en-US"/>
           </a:p>
@@ -1956,7 +1956,7 @@
           <a:p>
             <a:fld id="{DE1B52ED-5A32-3B40-B289-658C0187859D}" type="datetimeFigureOut">
               <a:rPr lang="en-US" smtClean="0"/>
-              <a:t>7/23/21</a:t>
+              <a:t>9/30/21</a:t>
             </a:fld>
             <a:endParaRPr lang="en-US"/>
           </a:p>
@@ -2069,7 +2069,7 @@
           <a:p>
             <a:fld id="{DE1B52ED-5A32-3B40-B289-658C0187859D}" type="datetimeFigureOut">
               <a:rPr lang="en-US" smtClean="0"/>
-              <a:t>7/23/21</a:t>
+              <a:t>9/30/21</a:t>
             </a:fld>
             <a:endParaRPr lang="en-US"/>
           </a:p>
@@ -2380,7 +2380,7 @@
           <a:p>
             <a:fld id="{DE1B52ED-5A32-3B40-B289-658C0187859D}" type="datetimeFigureOut">
               <a:rPr lang="en-US" smtClean="0"/>
-              <a:t>7/23/21</a:t>
+              <a:t>9/30/21</a:t>
             </a:fld>
             <a:endParaRPr lang="en-US"/>
           </a:p>
@@ -2668,7 +2668,7 @@
           <a:p>
             <a:fld id="{DE1B52ED-5A32-3B40-B289-658C0187859D}" type="datetimeFigureOut">
               <a:rPr lang="en-US" smtClean="0"/>
-              <a:t>7/23/21</a:t>
+              <a:t>9/30/21</a:t>
             </a:fld>
             <a:endParaRPr lang="en-US"/>
           </a:p>
@@ -2909,7 +2909,7 @@
           <a:p>
             <a:fld id="{DE1B52ED-5A32-3B40-B289-658C0187859D}" type="datetimeFigureOut">
               <a:rPr lang="en-US" smtClean="0"/>
-              <a:t>7/23/21</a:t>
+              <a:t>9/30/21</a:t>
             </a:fld>
             <a:endParaRPr lang="en-US"/>
           </a:p>

</xml_diff>